<commit_message>
Update etw collection guidance
</commit_message>
<xml_diff>
--- a/Doc/TroubleshootingMSBuild.pptx
+++ b/Doc/TroubleshootingMSBuild.pptx
@@ -6932,36 +6932,66 @@
             </a:br>
             <a:r>
               <a:rPr lang="en-US" dirty="0"/>
-              <a:t>	/Providers=*Microsoft-Build</a:t>
+              <a:t>	/Providers=*Microsoft-Build     // Collect </a:t>
+            </a:r>
+            <a:r>
+              <a:rPr lang="en-US" dirty="0" err="1"/>
+              <a:t>MSBuild</a:t>
+            </a:r>
+            <a:r>
+              <a:rPr lang="en-US" dirty="0"/>
+              <a:t> ETW events</a:t>
             </a:r>
             <a:br>
               <a:rPr lang="en-US" dirty="0"/>
             </a:br>
             <a:r>
               <a:rPr lang="en-US" dirty="0"/>
-              <a:t>	/BufferSize:8096                             // MB, in-memory buffer (I/O catching-up)</a:t>
+              <a:t>         </a:t>
+            </a:r>
+            <a:r>
+              <a:rPr lang="en-US" b="0" i="0" dirty="0">
+                <a:solidFill>
+                  <a:srgbClr val="1F2328"/>
+                </a:solidFill>
+                <a:effectLst/>
+                <a:latin typeface="-apple-system"/>
+              </a:rPr>
+              <a:t>/</a:t>
+            </a:r>
+            <a:r>
+              <a:rPr lang="en-US" b="0" i="0" dirty="0" err="1">
+                <a:solidFill>
+                  <a:srgbClr val="1F2328"/>
+                </a:solidFill>
+                <a:effectLst/>
+                <a:latin typeface="-apple-system"/>
+              </a:rPr>
+              <a:t>threadTime</a:t>
+            </a:r>
+            <a:r>
+              <a:rPr lang="en-US" b="0" i="0" dirty="0">
+                <a:solidFill>
+                  <a:srgbClr val="1F2328"/>
+                </a:solidFill>
+                <a:effectLst/>
+                <a:latin typeface="-apple-system"/>
+              </a:rPr>
+              <a:t>                                   // Collect thread times (with stacks)</a:t>
             </a:r>
             <a:br>
               <a:rPr lang="en-US" dirty="0"/>
             </a:br>
             <a:r>
               <a:rPr lang="en-US" dirty="0"/>
-              <a:t>	/CircularMB:8096                           // Max result file size</a:t>
+              <a:t>	/BufferSize:8096                             // MB, in-memory buffer (I/O catching-up)</a:t>
             </a:r>
             <a:br>
               <a:rPr lang="en-US" dirty="0"/>
             </a:br>
             <a:r>
               <a:rPr lang="en-US" dirty="0"/>
-              <a:t>	/</a:t>
-            </a:r>
-            <a:r>
-              <a:rPr lang="en-US" dirty="0" err="1"/>
-              <a:t>NoNGenRundown</a:t>
-            </a:r>
-            <a:r>
-              <a:rPr lang="en-US" dirty="0"/>
-              <a:t>                        // Skip symbols for NGEN</a:t>
+              <a:t>	/CircularMB:8096                           // Max result file size</a:t>
             </a:r>
             <a:br>
               <a:rPr lang="en-US" dirty="0"/>
@@ -6972,11 +7002,11 @@
             </a:r>
             <a:r>
               <a:rPr lang="en-US" dirty="0" err="1"/>
-              <a:t>Merge:False</a:t>
+              <a:t>NoNGenRundown</a:t>
             </a:r>
             <a:r>
               <a:rPr lang="en-US" dirty="0"/>
-              <a:t>                                     // Symbols, Bins. Needed for export</a:t>
+              <a:t>                        // Skip symbols for NGEN</a:t>
             </a:r>
             <a:br>
               <a:rPr lang="en-US" dirty="0"/>
@@ -6987,6 +7017,21 @@
             </a:r>
             <a:r>
               <a:rPr lang="en-US" dirty="0" err="1"/>
+              <a:t>Merge:False</a:t>
+            </a:r>
+            <a:r>
+              <a:rPr lang="en-US" dirty="0"/>
+              <a:t>                                     // Symbols, Bins. Needed for export</a:t>
+            </a:r>
+            <a:br>
+              <a:rPr lang="en-US" dirty="0"/>
+            </a:br>
+            <a:r>
+              <a:rPr lang="en-US" dirty="0"/>
+              <a:t>	/</a:t>
+            </a:r>
+            <a:r>
+              <a:rPr lang="en-US" dirty="0" err="1"/>
               <a:t>DataFile</a:t>
             </a:r>
             <a:r>
@@ -7027,7 +7072,31 @@
             </a:r>
             <a:r>
               <a:rPr lang="en-US" sz="1200" i="1" dirty="0"/>
-              <a:t> /Providers=*Microsoft-Build /BufferSize:8096 /CircularMB:8096 /</a:t>
+              <a:t> /Providers=*Microsoft-Build </a:t>
+            </a:r>
+            <a:r>
+              <a:rPr lang="en-US" sz="1050" b="0" i="0" dirty="0">
+                <a:solidFill>
+                  <a:srgbClr val="1F2328"/>
+                </a:solidFill>
+                <a:effectLst/>
+                <a:latin typeface="-apple-system"/>
+              </a:rPr>
+              <a:t>/</a:t>
+            </a:r>
+            <a:r>
+              <a:rPr lang="en-US" sz="1050" b="0" i="0" dirty="0" err="1">
+                <a:solidFill>
+                  <a:srgbClr val="1F2328"/>
+                </a:solidFill>
+                <a:effectLst/>
+                <a:latin typeface="-apple-system"/>
+              </a:rPr>
+              <a:t>threadTime</a:t>
+            </a:r>
+            <a:r>
+              <a:rPr lang="en-US" sz="1200" i="1" dirty="0"/>
+              <a:t> /BufferSize:8096 /CircularMB:8096 /</a:t>
             </a:r>
             <a:r>
               <a:rPr lang="en-US" sz="1200" i="1" dirty="0" err="1"/>

</xml_diff>

<commit_message>
Apply WUG deck styling
</commit_message>
<xml_diff>
--- a/Doc/TroubleshootingMSBuild.pptx
+++ b/Doc/TroubleshootingMSBuild.pptx
@@ -6947,7 +6947,15 @@
             </a:br>
             <a:r>
               <a:rPr lang="en-US" dirty="0"/>
-              <a:t>         </a:t>
+              <a:t>         /</a:t>
+            </a:r>
+            <a:r>
+              <a:rPr lang="en-US" dirty="0" err="1"/>
+              <a:t>threadTime</a:t>
+            </a:r>
+            <a:r>
+              <a:rPr lang="en-US" dirty="0"/>
+              <a:t>                                      </a:t>
             </a:r>
             <a:r>
               <a:rPr lang="en-US" b="0" i="0" dirty="0">
@@ -6957,27 +6965,7 @@
                 <a:effectLst/>
                 <a:latin typeface="-apple-system"/>
               </a:rPr>
-              <a:t>/</a:t>
-            </a:r>
-            <a:r>
-              <a:rPr lang="en-US" b="0" i="0" dirty="0" err="1">
-                <a:solidFill>
-                  <a:srgbClr val="1F2328"/>
-                </a:solidFill>
-                <a:effectLst/>
-                <a:latin typeface="-apple-system"/>
-              </a:rPr>
-              <a:t>threadTime</a:t>
-            </a:r>
-            <a:r>
-              <a:rPr lang="en-US" b="0" i="0" dirty="0">
-                <a:solidFill>
-                  <a:srgbClr val="1F2328"/>
-                </a:solidFill>
-                <a:effectLst/>
-                <a:latin typeface="-apple-system"/>
-              </a:rPr>
-              <a:t>                                   // Collect thread times (with stacks)</a:t>
+              <a:t>// Collect thread times (with stacks)</a:t>
             </a:r>
             <a:br>
               <a:rPr lang="en-US" dirty="0"/>
@@ -7059,59 +7047,43 @@
               <a:buChar char="•"/>
             </a:pPr>
             <a:r>
-              <a:rPr lang="en-US" sz="1200" i="1" dirty="0" err="1"/>
+              <a:rPr lang="en-US" sz="1100" i="1" dirty="0" err="1"/>
               <a:t>perfview</a:t>
             </a:r>
             <a:r>
-              <a:rPr lang="en-US" sz="1200" i="1" dirty="0"/>
+              <a:rPr lang="en-US" sz="1100" i="1" dirty="0"/>
               <a:t> collect /</a:t>
             </a:r>
             <a:r>
-              <a:rPr lang="en-US" sz="1200" i="1" dirty="0" err="1"/>
+              <a:rPr lang="en-US" sz="1100" i="1" dirty="0" err="1"/>
               <a:t>NoGui</a:t>
             </a:r>
             <a:r>
-              <a:rPr lang="en-US" sz="1200" i="1" dirty="0"/>
-              <a:t> /Providers=*Microsoft-Build </a:t>
-            </a:r>
-            <a:r>
-              <a:rPr lang="en-US" sz="1050" b="0" i="0" dirty="0">
-                <a:solidFill>
-                  <a:srgbClr val="1F2328"/>
-                </a:solidFill>
-                <a:effectLst/>
-                <a:latin typeface="-apple-system"/>
-              </a:rPr>
-              <a:t>/</a:t>
-            </a:r>
-            <a:r>
-              <a:rPr lang="en-US" sz="1050" b="0" i="0" dirty="0" err="1">
-                <a:solidFill>
-                  <a:srgbClr val="1F2328"/>
-                </a:solidFill>
-                <a:effectLst/>
-                <a:latin typeface="-apple-system"/>
-              </a:rPr>
+              <a:rPr lang="en-US" sz="1100" i="1" dirty="0"/>
+              <a:t> /Providers=*Microsoft-Build /</a:t>
+            </a:r>
+            <a:r>
+              <a:rPr lang="en-US" sz="1100" i="1" dirty="0" err="1"/>
               <a:t>threadTime</a:t>
             </a:r>
             <a:r>
-              <a:rPr lang="en-US" sz="1200" i="1" dirty="0"/>
+              <a:rPr lang="en-US" sz="1100" i="1" dirty="0"/>
               <a:t> /BufferSize:8096 /CircularMB:8096 /</a:t>
             </a:r>
             <a:r>
-              <a:rPr lang="en-US" sz="1200" i="1" dirty="0" err="1"/>
+              <a:rPr lang="en-US" sz="1100" i="1" dirty="0" err="1"/>
               <a:t>NoNGenRundown</a:t>
             </a:r>
             <a:r>
-              <a:rPr lang="en-US" sz="1200" i="1" dirty="0"/>
+              <a:rPr lang="en-US" sz="1100" i="1" dirty="0"/>
               <a:t> /</a:t>
             </a:r>
             <a:r>
-              <a:rPr lang="en-US" sz="1200" i="1" dirty="0" err="1"/>
+              <a:rPr lang="en-US" sz="1100" i="1" dirty="0" err="1"/>
               <a:t>Merge:False</a:t>
             </a:r>
             <a:r>
-              <a:rPr lang="en-US" sz="1200" i="1" dirty="0"/>
+              <a:rPr lang="en-US" sz="1100" i="1" dirty="0"/>
               <a:t> /DataFile:example01</a:t>
             </a:r>
           </a:p>

</xml_diff>